<commit_message>
Updated slides and added pdf format
</commit_message>
<xml_diff>
--- a/BGUG-Spock.pptx
+++ b/BGUG-Spock.pptx
@@ -5,7 +5,7 @@
     <p:sldMasterId id="2147483660" r:id="rId1"/>
   </p:sldMasterIdLst>
   <p:notesMasterIdLst>
-    <p:notesMasterId r:id="rId14"/>
+    <p:notesMasterId r:id="rId13"/>
   </p:notesMasterIdLst>
   <p:sldIdLst>
     <p:sldId id="256" r:id="rId2"/>
@@ -19,7 +19,6 @@
     <p:sldId id="262" r:id="rId10"/>
     <p:sldId id="265" r:id="rId11"/>
     <p:sldId id="266" r:id="rId12"/>
-    <p:sldId id="267" r:id="rId13"/>
   </p:sldIdLst>
   <p:sldSz cx="9144000" cy="6858000" type="screen4x3"/>
   <p:notesSz cx="6858000" cy="9144000"/>
@@ -4462,6 +4461,13 @@
   <p:clrMapOvr>
     <a:masterClrMapping/>
   </p:clrMapOvr>
+  <p:timing>
+    <p:tnLst>
+      <p:par>
+        <p:cTn xmlns:p14="http://schemas.microsoft.com/office/powerpoint/2010/main" id="1" dur="indefinite" restart="never" nodeType="tmRoot"/>
+      </p:par>
+    </p:tnLst>
+  </p:timing>
 </p:sld>
 </file>
 
@@ -4624,36 +4630,13 @@
   <p:clrMapOvr>
     <a:masterClrMapping/>
   </p:clrMapOvr>
-</p:sld>
-</file>
-
-<file path=ppt/slides/slide12.xml><?xml version="1.0" encoding="utf-8"?>
-<p:sld xmlns:a="http://schemas.openxmlformats.org/drawingml/2006/main" xmlns:r="http://schemas.openxmlformats.org/officeDocument/2006/relationships" xmlns:p="http://schemas.openxmlformats.org/presentationml/2006/main">
-  <p:cSld>
-    <p:spTree>
-      <p:nvGrpSpPr>
-        <p:cNvPr id="1" name=""/>
-        <p:cNvGrpSpPr/>
-        <p:nvPr/>
-      </p:nvGrpSpPr>
-      <p:grpSpPr>
-        <a:xfrm>
-          <a:off x="0" y="0"/>
-          <a:ext cx="0" cy="0"/>
-          <a:chOff x="0" y="0"/>
-          <a:chExt cx="0" cy="0"/>
-        </a:xfrm>
-      </p:grpSpPr>
-    </p:spTree>
-    <p:extLst>
-      <p:ext uri="{BB962C8B-B14F-4D97-AF65-F5344CB8AC3E}">
-        <p14:creationId xmlns:p14="http://schemas.microsoft.com/office/powerpoint/2010/main" val="2576121680"/>
-      </p:ext>
-    </p:extLst>
-  </p:cSld>
-  <p:clrMapOvr>
-    <a:masterClrMapping/>
-  </p:clrMapOvr>
+  <p:timing>
+    <p:tnLst>
+      <p:par>
+        <p:cTn xmlns:p14="http://schemas.microsoft.com/office/powerpoint/2010/main" id="1" dur="indefinite" restart="never" nodeType="tmRoot"/>
+      </p:par>
+    </p:tnLst>
+  </p:timing>
 </p:sld>
 </file>
 
@@ -4775,6 +4758,13 @@
   <p:clrMapOvr>
     <a:masterClrMapping/>
   </p:clrMapOvr>
+  <p:timing>
+    <p:tnLst>
+      <p:par>
+        <p:cTn xmlns:p14="http://schemas.microsoft.com/office/powerpoint/2010/main" id="1" dur="indefinite" restart="never" nodeType="tmRoot"/>
+      </p:par>
+    </p:tnLst>
+  </p:timing>
 </p:sld>
 </file>
 
@@ -5057,13 +5047,8 @@
             <a:pPr lvl="1"/>
             <a:r>
               <a:rPr lang="en-US" dirty="0" smtClean="0"/>
-              <a:t>Check it’s </a:t>
-            </a:r>
-            <a:r>
-              <a:rPr lang="en-US" dirty="0" smtClean="0"/>
-              <a:t>state</a:t>
-            </a:r>
-            <a:endParaRPr lang="en-US" dirty="0" smtClean="0"/>
+              <a:t>Check it’s state</a:t>
+            </a:r>
           </a:p>
         </p:txBody>
       </p:sp>
@@ -5272,6 +5257,13 @@
   <p:clrMapOvr>
     <a:masterClrMapping/>
   </p:clrMapOvr>
+  <p:timing>
+    <p:tnLst>
+      <p:par>
+        <p:cTn xmlns:p14="http://schemas.microsoft.com/office/powerpoint/2010/main" id="1" dur="indefinite" restart="never" nodeType="tmRoot"/>
+      </p:par>
+    </p:tnLst>
+  </p:timing>
 </p:sld>
 </file>
 
@@ -5437,11 +5429,7 @@
             </a:r>
             <a:r>
               <a:rPr lang="en-US" dirty="0" smtClean="0"/>
-              <a:t> Comparison </a:t>
-            </a:r>
-            <a:r>
-              <a:rPr lang="en-US" dirty="0" smtClean="0"/>
-              <a:t>to </a:t>
+              <a:t> Comparison to </a:t>
             </a:r>
             <a:r>
               <a:rPr lang="en-US" dirty="0" err="1" smtClean="0"/>
@@ -5914,6 +5902,13 @@
   <p:clrMapOvr>
     <a:masterClrMapping/>
   </p:clrMapOvr>
+  <p:timing>
+    <p:tnLst>
+      <p:par>
+        <p:cTn xmlns:p14="http://schemas.microsoft.com/office/powerpoint/2010/main" id="1" dur="indefinite" restart="never" nodeType="tmRoot"/>
+      </p:par>
+    </p:tnLst>
+  </p:timing>
 </p:sld>
 </file>
 
@@ -6083,6 +6078,13 @@
   <p:clrMapOvr>
     <a:masterClrMapping/>
   </p:clrMapOvr>
+  <p:timing>
+    <p:tnLst>
+      <p:par>
+        <p:cTn xmlns:p14="http://schemas.microsoft.com/office/powerpoint/2010/main" id="1" dur="indefinite" restart="never" nodeType="tmRoot"/>
+      </p:par>
+    </p:tnLst>
+  </p:timing>
 </p:sld>
 </file>
 
@@ -6255,6 +6257,13 @@
   <p:clrMapOvr>
     <a:masterClrMapping/>
   </p:clrMapOvr>
+  <p:timing>
+    <p:tnLst>
+      <p:par>
+        <p:cTn xmlns:p14="http://schemas.microsoft.com/office/powerpoint/2010/main" id="1" dur="indefinite" restart="never" nodeType="tmRoot"/>
+      </p:par>
+    </p:tnLst>
+  </p:timing>
 </p:sld>
 </file>
 

</xml_diff>